<commit_message>
Added in hash table stuff to report
</commit_message>
<xml_diff>
--- a/Report/FYP_Pitch.pptx
+++ b/Report/FYP_Pitch.pptx
@@ -141,6 +141,347 @@
     </a:lvl9pPr>
   </p:defaultTextStyle>
 </p:presentation>
+</file>
+
+<file path=ppt/charts/chart1.xml><?xml version="1.0" encoding="utf-8"?>
+<c:chartSpace xmlns:c="http://schemas.openxmlformats.org/drawingml/2006/chart" xmlns:a="http://schemas.openxmlformats.org/drawingml/2006/main" xmlns:r="http://schemas.openxmlformats.org/officeDocument/2006/relationships">
+  <c:date1904 val="0"/>
+  <c:lang val="en-IE"/>
+  <c:roundedCorners val="0"/>
+  <mc:AlternateContent xmlns:mc="http://schemas.openxmlformats.org/markup-compatibility/2006">
+    <mc:Choice xmlns:c14="http://schemas.microsoft.com/office/drawing/2007/8/2/chart" Requires="c14">
+      <c14:style val="102"/>
+    </mc:Choice>
+    <mc:Fallback>
+      <c:style val="2"/>
+    </mc:Fallback>
+  </mc:AlternateContent>
+  <c:chart>
+    <c:title>
+      <c:tx>
+        <c:rich>
+          <a:bodyPr/>
+          <a:lstStyle/>
+          <a:p>
+            <a:pPr>
+              <a:defRPr/>
+            </a:pPr>
+            <a:r>
+              <a:rPr lang="en-IE"/>
+              <a:t>Singly</a:t>
+            </a:r>
+            <a:r>
+              <a:rPr lang="en-IE" baseline="0"/>
+              <a:t> Linked List; Stoker; Test-And-Test-and-Set Lock vs Lockless; 128 Key Range</a:t>
+            </a:r>
+            <a:endParaRPr lang="en-IE"/>
+          </a:p>
+        </c:rich>
+      </c:tx>
+      <c:layout/>
+      <c:overlay val="0"/>
+    </c:title>
+    <c:autoTitleDeleted val="0"/>
+    <c:plotArea>
+      <c:layout/>
+      <c:lineChart>
+        <c:grouping val="standard"/>
+        <c:varyColors val="0"/>
+        <c:ser>
+          <c:idx val="7"/>
+          <c:order val="0"/>
+          <c:tx>
+            <c:strRef>
+              <c:f>Sheet1!$A$6</c:f>
+              <c:strCache>
+                <c:ptCount val="1"/>
+                <c:pt idx="0">
+                  <c:v>Stoker (32 Core) Lockless</c:v>
+                </c:pt>
+              </c:strCache>
+            </c:strRef>
+          </c:tx>
+          <c:spPr>
+            <a:ln>
+              <a:solidFill>
+                <a:srgbClr val="C00000"/>
+              </a:solidFill>
+            </a:ln>
+          </c:spPr>
+          <c:marker>
+            <c:spPr>
+              <a:ln>
+                <a:solidFill>
+                  <a:srgbClr val="C00000"/>
+                </a:solidFill>
+              </a:ln>
+            </c:spPr>
+          </c:marker>
+          <c:cat>
+            <c:numRef>
+              <c:f>Sheet1!$B$4:$I$4</c:f>
+              <c:numCache>
+                <c:formatCode>General</c:formatCode>
+                <c:ptCount val="8"/>
+                <c:pt idx="0">
+                  <c:v>1</c:v>
+                </c:pt>
+                <c:pt idx="1">
+                  <c:v>2</c:v>
+                </c:pt>
+                <c:pt idx="2">
+                  <c:v>4</c:v>
+                </c:pt>
+                <c:pt idx="3">
+                  <c:v>8</c:v>
+                </c:pt>
+                <c:pt idx="4">
+                  <c:v>16</c:v>
+                </c:pt>
+                <c:pt idx="5">
+                  <c:v>32</c:v>
+                </c:pt>
+                <c:pt idx="6">
+                  <c:v>64</c:v>
+                </c:pt>
+                <c:pt idx="7">
+                  <c:v>128</c:v>
+                </c:pt>
+              </c:numCache>
+            </c:numRef>
+          </c:cat>
+          <c:val>
+            <c:numRef>
+              <c:f>Sheet1!$B$6:$I$6</c:f>
+              <c:numCache>
+                <c:formatCode>_(* #,##0.00_);_(* \(#,##0.00\);_(* "-"??_);_(@_)</c:formatCode>
+                <c:ptCount val="8"/>
+                <c:pt idx="0">
+                  <c:v>3457942</c:v>
+                </c:pt>
+                <c:pt idx="1">
+                  <c:v>3416827</c:v>
+                </c:pt>
+                <c:pt idx="2">
+                  <c:v>7830031</c:v>
+                </c:pt>
+                <c:pt idx="3">
+                  <c:v>3385509</c:v>
+                </c:pt>
+                <c:pt idx="4">
+                  <c:v>868520</c:v>
+                </c:pt>
+                <c:pt idx="5">
+                  <c:v>817838</c:v>
+                </c:pt>
+                <c:pt idx="6">
+                  <c:v>830026</c:v>
+                </c:pt>
+                <c:pt idx="7">
+                  <c:v>933362</c:v>
+                </c:pt>
+              </c:numCache>
+            </c:numRef>
+          </c:val>
+          <c:smooth val="0"/>
+        </c:ser>
+        <c:ser>
+          <c:idx val="0"/>
+          <c:order val="1"/>
+          <c:tx>
+            <c:strRef>
+              <c:f>Sheet1!$A$20</c:f>
+              <c:strCache>
+                <c:ptCount val="1"/>
+                <c:pt idx="0">
+                  <c:v>Stoker (32 Core) TTAS_RELAX</c:v>
+                </c:pt>
+              </c:strCache>
+            </c:strRef>
+          </c:tx>
+          <c:spPr>
+            <a:ln>
+              <a:solidFill>
+                <a:srgbClr val="00B0F0"/>
+              </a:solidFill>
+            </a:ln>
+          </c:spPr>
+          <c:marker>
+            <c:spPr>
+              <a:ln>
+                <a:solidFill>
+                  <a:srgbClr val="00B0F0"/>
+                </a:solidFill>
+              </a:ln>
+            </c:spPr>
+          </c:marker>
+          <c:cat>
+            <c:numRef>
+              <c:f>Sheet1!$B$4:$I$4</c:f>
+              <c:numCache>
+                <c:formatCode>General</c:formatCode>
+                <c:ptCount val="8"/>
+                <c:pt idx="0">
+                  <c:v>1</c:v>
+                </c:pt>
+                <c:pt idx="1">
+                  <c:v>2</c:v>
+                </c:pt>
+                <c:pt idx="2">
+                  <c:v>4</c:v>
+                </c:pt>
+                <c:pt idx="3">
+                  <c:v>8</c:v>
+                </c:pt>
+                <c:pt idx="4">
+                  <c:v>16</c:v>
+                </c:pt>
+                <c:pt idx="5">
+                  <c:v>32</c:v>
+                </c:pt>
+                <c:pt idx="6">
+                  <c:v>64</c:v>
+                </c:pt>
+                <c:pt idx="7">
+                  <c:v>128</c:v>
+                </c:pt>
+              </c:numCache>
+            </c:numRef>
+          </c:cat>
+          <c:val>
+            <c:numRef>
+              <c:f>Sheet1!$B$20:$I$20</c:f>
+              <c:numCache>
+                <c:formatCode>_(* #,##0.00_);_(* \(#,##0.00\);_(* "-"??_);_(@_)</c:formatCode>
+                <c:ptCount val="8"/>
+                <c:pt idx="0">
+                  <c:v>1850426</c:v>
+                </c:pt>
+                <c:pt idx="1">
+                  <c:v>1181226</c:v>
+                </c:pt>
+                <c:pt idx="2">
+                  <c:v>356901</c:v>
+                </c:pt>
+                <c:pt idx="3">
+                  <c:v>219340</c:v>
+                </c:pt>
+                <c:pt idx="4">
+                  <c:v>168997</c:v>
+                </c:pt>
+                <c:pt idx="5">
+                  <c:v>155932</c:v>
+                </c:pt>
+                <c:pt idx="6">
+                  <c:v>660067</c:v>
+                </c:pt>
+                <c:pt idx="7">
+                  <c:v>353075</c:v>
+                </c:pt>
+              </c:numCache>
+            </c:numRef>
+          </c:val>
+          <c:smooth val="0"/>
+        </c:ser>
+        <c:dLbls>
+          <c:showLegendKey val="0"/>
+          <c:showVal val="0"/>
+          <c:showCatName val="0"/>
+          <c:showSerName val="0"/>
+          <c:showPercent val="0"/>
+          <c:showBubbleSize val="0"/>
+        </c:dLbls>
+        <c:marker val="1"/>
+        <c:smooth val="0"/>
+        <c:axId val="69124864"/>
+        <c:axId val="69127168"/>
+      </c:lineChart>
+      <c:catAx>
+        <c:axId val="69124864"/>
+        <c:scaling>
+          <c:orientation val="minMax"/>
+        </c:scaling>
+        <c:delete val="0"/>
+        <c:axPos val="b"/>
+        <c:title>
+          <c:tx>
+            <c:rich>
+              <a:bodyPr/>
+              <a:lstStyle/>
+              <a:p>
+                <a:pPr>
+                  <a:defRPr/>
+                </a:pPr>
+                <a:r>
+                  <a:rPr lang="en-US"/>
+                  <a:t>Number of Threads</a:t>
+                </a:r>
+              </a:p>
+            </c:rich>
+          </c:tx>
+          <c:layout/>
+          <c:overlay val="0"/>
+        </c:title>
+        <c:numFmt formatCode="General" sourceLinked="1"/>
+        <c:majorTickMark val="out"/>
+        <c:minorTickMark val="none"/>
+        <c:tickLblPos val="nextTo"/>
+        <c:crossAx val="69127168"/>
+        <c:crosses val="autoZero"/>
+        <c:auto val="1"/>
+        <c:lblAlgn val="ctr"/>
+        <c:lblOffset val="100"/>
+        <c:noMultiLvlLbl val="0"/>
+      </c:catAx>
+      <c:valAx>
+        <c:axId val="69127168"/>
+        <c:scaling>
+          <c:orientation val="minMax"/>
+        </c:scaling>
+        <c:delete val="0"/>
+        <c:axPos val="l"/>
+        <c:majorGridlines/>
+        <c:title>
+          <c:tx>
+            <c:rich>
+              <a:bodyPr rot="-5400000" vert="horz"/>
+              <a:lstStyle/>
+              <a:p>
+                <a:pPr>
+                  <a:defRPr/>
+                </a:pPr>
+                <a:r>
+                  <a:rPr lang="en-US"/>
+                  <a:t>Iterations per second</a:t>
+                </a:r>
+              </a:p>
+            </c:rich>
+          </c:tx>
+          <c:layout/>
+          <c:overlay val="0"/>
+        </c:title>
+        <c:numFmt formatCode="_(* #,##0.00_);_(* \(#,##0.00\);_(* &quot;-&quot;??_);_(@_)" sourceLinked="1"/>
+        <c:majorTickMark val="out"/>
+        <c:minorTickMark val="none"/>
+        <c:tickLblPos val="nextTo"/>
+        <c:crossAx val="69124864"/>
+        <c:crosses val="autoZero"/>
+        <c:crossBetween val="between"/>
+      </c:valAx>
+    </c:plotArea>
+    <c:legend>
+      <c:legendPos val="r"/>
+      <c:layout/>
+      <c:overlay val="0"/>
+    </c:legend>
+    <c:plotVisOnly val="1"/>
+    <c:dispBlanksAs val="gap"/>
+    <c:showDLblsOverMax val="0"/>
+  </c:chart>
+  <c:externalData r:id="rId1">
+    <c:autoUpdate val="0"/>
+  </c:externalData>
+</c:chartSpace>
 </file>
 
 <file path=ppt/notesMasters/notesMaster1.xml><?xml version="1.0" encoding="utf-8"?>
@@ -4059,6 +4400,13 @@
   <p:clrMapOvr>
     <a:masterClrMapping/>
   </p:clrMapOvr>
+  <p:timing>
+    <p:tnLst>
+      <p:par>
+        <p:cTn id="1" dur="indefinite" restart="never" nodeType="tmRoot"/>
+      </p:par>
+    </p:tnLst>
+  </p:timing>
 </p:sld>
 </file>
 
@@ -4137,8 +4485,13 @@
             <a:pPr lvl="1"/>
             <a:r>
               <a:rPr lang="en-IE" dirty="0" smtClean="0"/>
-              <a:t>Not much comparison data</a:t>
-            </a:r>
+              <a:t>Not much </a:t>
+            </a:r>
+            <a:r>
+              <a:rPr lang="en-IE" dirty="0" smtClean="0"/>
+              <a:t>data comparing the different variations </a:t>
+            </a:r>
+            <a:endParaRPr lang="en-IE" dirty="0" smtClean="0"/>
           </a:p>
           <a:p>
             <a:pPr marL="456967" lvl="1" indent="0">
@@ -4160,27 +4513,30 @@
             <a:pPr lvl="1"/>
             <a:r>
               <a:rPr lang="en-IE" dirty="0"/>
-              <a:t>Ring Buffer</a:t>
+              <a:t>Ring </a:t>
+            </a:r>
+            <a:r>
+              <a:rPr lang="en-IE" dirty="0" smtClean="0"/>
+              <a:t>Buffer </a:t>
             </a:r>
           </a:p>
           <a:p>
             <a:pPr lvl="1"/>
             <a:r>
-              <a:rPr lang="en-IE" dirty="0"/>
-              <a:t>Linked List</a:t>
+              <a:rPr lang="en-IE" dirty="0" smtClean="0"/>
+              <a:t>Linked List 	</a:t>
             </a:r>
           </a:p>
           <a:p>
             <a:pPr lvl="1"/>
             <a:r>
-              <a:rPr lang="en-IE" dirty="0"/>
-              <a:t>Hash Table</a:t>
-            </a:r>
-          </a:p>
-          <a:p>
-            <a:pPr marL="0" indent="0">
-              <a:buNone/>
-            </a:pPr>
+              <a:rPr lang="en-IE" dirty="0" smtClean="0"/>
+              <a:t>Hash Table </a:t>
+            </a:r>
+            <a:r>
+              <a:rPr lang="en-IE" smtClean="0"/>
+              <a:t>	</a:t>
+            </a:r>
             <a:endParaRPr lang="en-IE" dirty="0"/>
           </a:p>
           <a:p>
@@ -4193,6 +4549,13 @@
   <p:clrMapOvr>
     <a:masterClrMapping/>
   </p:clrMapOvr>
+  <p:timing>
+    <p:tnLst>
+      <p:par>
+        <p:cTn id="1" dur="indefinite" restart="never" nodeType="tmRoot"/>
+      </p:par>
+    </p:tnLst>
+  </p:timing>
 </p:sld>
 </file>
 
@@ -4230,11 +4593,7 @@
           <a:p>
             <a:r>
               <a:rPr lang="en-IE" dirty="0" smtClean="0"/>
-              <a:t>The </a:t>
-            </a:r>
-            <a:r>
-              <a:rPr lang="en-IE" dirty="0" smtClean="0"/>
-              <a:t>Method</a:t>
+              <a:t>The Method</a:t>
             </a:r>
             <a:endParaRPr lang="en-IE" dirty="0"/>
           </a:p>
@@ -5532,6 +5891,13 @@
   <p:clrMapOvr>
     <a:masterClrMapping/>
   </p:clrMapOvr>
+  <p:timing>
+    <p:tnLst>
+      <p:par>
+        <p:cTn id="1" dur="indefinite" restart="never" nodeType="tmRoot"/>
+      </p:par>
+    </p:tnLst>
+  </p:timing>
 </p:sld>
 </file>
 
@@ -5575,26 +5941,284 @@
           </a:p>
         </p:txBody>
       </p:sp>
-      <p:sp>
-        <p:nvSpPr>
-          <p:cNvPr id="3" name="Content Placeholder 2"/>
-          <p:cNvSpPr>
-            <a:spLocks noGrp="1"/>
-          </p:cNvSpPr>
+      <p:graphicFrame>
+        <p:nvGraphicFramePr>
+          <p:cNvPr id="8" name="Content Placeholder 7"/>
+          <p:cNvGraphicFramePr>
+            <a:graphicFrameLocks noGrp="1"/>
+          </p:cNvGraphicFramePr>
           <p:nvPr>
             <p:ph idx="1"/>
-          </p:nvPr>
-        </p:nvSpPr>
-        <p:spPr/>
-        <p:txBody>
-          <a:bodyPr/>
-          <a:lstStyle/>
-          <a:p>
-            <a:pPr lvl="1"/>
-            <a:endParaRPr lang="en-IE" dirty="0" smtClean="0"/>
-          </a:p>
-        </p:txBody>
-      </p:sp>
+            <p:extLst>
+              <p:ext uri="{D42A27DB-BD31-4B8C-83A1-F6EECF244321}">
+                <p14:modId xmlns:p14="http://schemas.microsoft.com/office/powerpoint/2010/main" val="4132989514"/>
+              </p:ext>
+            </p:extLst>
+          </p:nvPr>
+        </p:nvGraphicFramePr>
+        <p:xfrm>
+          <a:off x="-18729" y="1361397"/>
+          <a:ext cx="9036496" cy="2967703"/>
+        </p:xfrm>
+        <a:graphic>
+          <a:graphicData uri="http://schemas.openxmlformats.org/drawingml/2006/chart">
+            <c:chart xmlns:c="http://schemas.openxmlformats.org/drawingml/2006/chart" xmlns:r="http://schemas.openxmlformats.org/officeDocument/2006/relationships" r:id="rId2"/>
+          </a:graphicData>
+        </a:graphic>
+      </p:graphicFrame>
+      <p:graphicFrame>
+        <p:nvGraphicFramePr>
+          <p:cNvPr id="10" name="Table 9"/>
+          <p:cNvGraphicFramePr>
+            <a:graphicFrameLocks noGrp="1"/>
+          </p:cNvGraphicFramePr>
+          <p:nvPr>
+            <p:extLst>
+              <p:ext uri="{D42A27DB-BD31-4B8C-83A1-F6EECF244321}">
+                <p14:modId xmlns:p14="http://schemas.microsoft.com/office/powerpoint/2010/main" val="3581540839"/>
+              </p:ext>
+            </p:extLst>
+          </p:nvPr>
+        </p:nvGraphicFramePr>
+        <p:xfrm>
+          <a:off x="225303" y="4329100"/>
+          <a:ext cx="8775315" cy="2340260"/>
+        </p:xfrm>
+        <a:graphic>
+          <a:graphicData uri="http://schemas.openxmlformats.org/drawingml/2006/table">
+            <a:tbl>
+              <a:tblPr firstRow="1" bandRow="1">
+                <a:tableStyleId>{0505E3EF-67EA-436B-97B2-0124C06EBD24}</a:tableStyleId>
+              </a:tblPr>
+              <a:tblGrid>
+                <a:gridCol w="2925105"/>
+                <a:gridCol w="2925105"/>
+                <a:gridCol w="2925105"/>
+              </a:tblGrid>
+              <a:tr h="468052">
+                <a:tc>
+                  <a:txBody>
+                    <a:bodyPr/>
+                    <a:lstStyle/>
+                    <a:p>
+                      <a:endParaRPr lang="en-IE" sz="1600" dirty="0"/>
+                    </a:p>
+                  </a:txBody>
+                  <a:tcPr/>
+                </a:tc>
+                <a:tc>
+                  <a:txBody>
+                    <a:bodyPr/>
+                    <a:lstStyle/>
+                    <a:p>
+                      <a:r>
+                        <a:rPr lang="en-IE" sz="1600" dirty="0" smtClean="0"/>
+                        <a:t>Stoker Lockless</a:t>
+                      </a:r>
+                      <a:endParaRPr lang="en-IE" sz="1600" dirty="0"/>
+                    </a:p>
+                  </a:txBody>
+                  <a:tcPr/>
+                </a:tc>
+                <a:tc>
+                  <a:txBody>
+                    <a:bodyPr/>
+                    <a:lstStyle/>
+                    <a:p>
+                      <a:r>
+                        <a:rPr lang="en-IE" sz="1600" dirty="0" smtClean="0"/>
+                        <a:t>Stoker TTAS_RELAX</a:t>
+                      </a:r>
+                      <a:endParaRPr lang="en-IE" sz="1600" dirty="0"/>
+                    </a:p>
+                  </a:txBody>
+                  <a:tcPr/>
+                </a:tc>
+              </a:tr>
+              <a:tr h="468052">
+                <a:tc>
+                  <a:txBody>
+                    <a:bodyPr/>
+                    <a:lstStyle/>
+                    <a:p>
+                      <a:r>
+                        <a:rPr lang="en-IE" sz="1600" dirty="0" smtClean="0"/>
+                        <a:t>Cache References</a:t>
+                      </a:r>
+                      <a:endParaRPr lang="en-IE" sz="1600" dirty="0"/>
+                    </a:p>
+                  </a:txBody>
+                  <a:tcPr/>
+                </a:tc>
+                <a:tc>
+                  <a:txBody>
+                    <a:bodyPr/>
+                    <a:lstStyle/>
+                    <a:p>
+                      <a:r>
+                        <a:rPr lang="en-IE" sz="1600" dirty="0" smtClean="0"/>
+                        <a:t>9.21x10^8</a:t>
+                      </a:r>
+                      <a:endParaRPr lang="en-IE" sz="1600" dirty="0"/>
+                    </a:p>
+                  </a:txBody>
+                  <a:tcPr/>
+                </a:tc>
+                <a:tc>
+                  <a:txBody>
+                    <a:bodyPr/>
+                    <a:lstStyle/>
+                    <a:p>
+                      <a:r>
+                        <a:rPr lang="en-IE" sz="1600" dirty="0" smtClean="0"/>
+                        <a:t>4.82x10^8</a:t>
+                      </a:r>
+                      <a:endParaRPr lang="en-IE" sz="1600" dirty="0"/>
+                    </a:p>
+                  </a:txBody>
+                  <a:tcPr/>
+                </a:tc>
+              </a:tr>
+              <a:tr h="468052">
+                <a:tc>
+                  <a:txBody>
+                    <a:bodyPr/>
+                    <a:lstStyle/>
+                    <a:p>
+                      <a:r>
+                        <a:rPr lang="en-IE" sz="1600" dirty="0" smtClean="0"/>
+                        <a:t>Cache Misses</a:t>
+                      </a:r>
+                      <a:endParaRPr lang="en-IE" sz="1600" dirty="0"/>
+                    </a:p>
+                  </a:txBody>
+                  <a:tcPr/>
+                </a:tc>
+                <a:tc>
+                  <a:txBody>
+                    <a:bodyPr/>
+                    <a:lstStyle/>
+                    <a:p>
+                      <a:r>
+                        <a:rPr lang="en-IE" sz="1600" dirty="0" smtClean="0"/>
+                        <a:t>3.76x10^8   (41%)</a:t>
+                      </a:r>
+                      <a:endParaRPr lang="en-IE" sz="1600" dirty="0"/>
+                    </a:p>
+                  </a:txBody>
+                  <a:tcPr/>
+                </a:tc>
+                <a:tc>
+                  <a:txBody>
+                    <a:bodyPr/>
+                    <a:lstStyle/>
+                    <a:p>
+                      <a:r>
+                        <a:rPr lang="en-IE" sz="1600" dirty="0" smtClean="0"/>
+                        <a:t>2.49x10^8   (52%)</a:t>
+                      </a:r>
+                      <a:endParaRPr lang="en-IE" sz="1600" dirty="0"/>
+                    </a:p>
+                  </a:txBody>
+                  <a:tcPr/>
+                </a:tc>
+              </a:tr>
+              <a:tr h="468052">
+                <a:tc>
+                  <a:txBody>
+                    <a:bodyPr/>
+                    <a:lstStyle/>
+                    <a:p>
+                      <a:r>
+                        <a:rPr lang="en-IE" sz="1600" dirty="0" smtClean="0"/>
+                        <a:t>CPU Cycles</a:t>
+                      </a:r>
+                      <a:endParaRPr lang="en-IE" sz="1600" dirty="0"/>
+                    </a:p>
+                  </a:txBody>
+                  <a:tcPr/>
+                </a:tc>
+                <a:tc>
+                  <a:txBody>
+                    <a:bodyPr/>
+                    <a:lstStyle/>
+                    <a:p>
+                      <a:r>
+                        <a:rPr lang="en-IE" sz="1600" dirty="0" smtClean="0"/>
+                        <a:t>2.32x10^12</a:t>
+                      </a:r>
+                      <a:endParaRPr lang="en-IE" sz="1600" dirty="0"/>
+                    </a:p>
+                  </a:txBody>
+                  <a:tcPr/>
+                </a:tc>
+                <a:tc>
+                  <a:txBody>
+                    <a:bodyPr/>
+                    <a:lstStyle/>
+                    <a:p>
+                      <a:r>
+                        <a:rPr lang="en-IE" sz="1600" dirty="0" smtClean="0"/>
+                        <a:t>2.68x10^12</a:t>
+                      </a:r>
+                      <a:endParaRPr lang="en-IE" sz="1600" dirty="0"/>
+                    </a:p>
+                  </a:txBody>
+                  <a:tcPr/>
+                </a:tc>
+              </a:tr>
+              <a:tr h="468052">
+                <a:tc>
+                  <a:txBody>
+                    <a:bodyPr/>
+                    <a:lstStyle/>
+                    <a:p>
+                      <a:r>
+                        <a:rPr lang="en-IE" sz="1600" dirty="0" smtClean="0"/>
+                        <a:t>Stalled Backend Cycles</a:t>
+                      </a:r>
+                      <a:endParaRPr lang="en-IE" sz="1600" dirty="0"/>
+                    </a:p>
+                  </a:txBody>
+                  <a:tcPr/>
+                </a:tc>
+                <a:tc>
+                  <a:txBody>
+                    <a:bodyPr/>
+                    <a:lstStyle/>
+                    <a:p>
+                      <a:r>
+                        <a:rPr lang="en-IE" sz="1600" dirty="0" smtClean="0"/>
+                        <a:t>1.37x10^12 (60%)</a:t>
+                      </a:r>
+                      <a:endParaRPr lang="en-IE" sz="1600" dirty="0"/>
+                    </a:p>
+                  </a:txBody>
+                  <a:tcPr/>
+                </a:tc>
+                <a:tc>
+                  <a:txBody>
+                    <a:bodyPr/>
+                    <a:lstStyle/>
+                    <a:p>
+                      <a:r>
+                        <a:rPr lang="en-IE" sz="1600" dirty="0" smtClean="0"/>
+                        <a:t>2.28x10^12</a:t>
+                      </a:r>
+                      <a:r>
+                        <a:rPr lang="en-IE" sz="1600" baseline="0" dirty="0" smtClean="0"/>
+                        <a:t> (85%)</a:t>
+                      </a:r>
+                      <a:endParaRPr lang="en-IE" sz="1600" dirty="0"/>
+                    </a:p>
+                  </a:txBody>
+                  <a:tcPr/>
+                </a:tc>
+              </a:tr>
+            </a:tbl>
+          </a:graphicData>
+        </a:graphic>
+      </p:graphicFrame>
     </p:spTree>
     <p:extLst>
       <p:ext uri="{BB962C8B-B14F-4D97-AF65-F5344CB8AC3E}">
@@ -5605,6 +6229,13 @@
   <p:clrMapOvr>
     <a:masterClrMapping/>
   </p:clrMapOvr>
+  <p:timing>
+    <p:tnLst>
+      <p:par>
+        <p:cTn id="1" dur="indefinite" restart="never" nodeType="tmRoot"/>
+      </p:par>
+    </p:tnLst>
+  </p:timing>
 </p:sld>
 </file>
 

</xml_diff>